<commit_message>
add a note in the presentation
</commit_message>
<xml_diff>
--- a/Task 5 Impressive Results/Exercise5.pptx
+++ b/Task 5 Impressive Results/Exercise5.pptx
@@ -118,7 +118,7 @@
   </p:defaultTextStyle>
   <p:extLst>
     <p:ext uri="{EFAFB233-063F-42B5-8137-9DF3F51BA10A}">
-      <p15:sldGuideLst xmlns:p15="http://schemas.microsoft.com/office/powerpoint/2012/main" xmlns="">
+      <p15:sldGuideLst xmlns="" xmlns:p15="http://schemas.microsoft.com/office/powerpoint/2012/main">
         <p15:guide id="1" orient="horz" pos="781">
           <p15:clr>
             <a:srgbClr val="A4A3A4"/>
@@ -212,7 +212,7 @@
       </p15:sldGuideLst>
     </p:ext>
     <p:ext uri="{2D200454-40CA-4A62-9FC3-DE9A4176ACB9}">
-      <p15:notesGuideLst xmlns:p15="http://schemas.microsoft.com/office/powerpoint/2012/main" xmlns="">
+      <p15:notesGuideLst xmlns="" xmlns:p15="http://schemas.microsoft.com/office/powerpoint/2012/main">
         <p15:guide id="1" orient="horz" pos="2676">
           <p15:clr>
             <a:srgbClr val="A4A3A4"/>
@@ -417,7 +417,7 @@
             <a:fld id="{4CBF50E3-ED67-46F2-ABFC-A36EE1082CF7}" type="slidenum">
               <a:rPr lang="en-US" b="1" smtClean="0"/>
               <a:pPr/>
-              <a:t>‹Nr.›</a:t>
+              <a:t>‹#›</a:t>
             </a:fld>
             <a:endParaRPr lang="en-US" b="1" dirty="0"/>
           </a:p>
@@ -1061,7 +1061,7 @@
     </p:spTree>
     <p:extLst>
       <p:ext uri="{BB962C8B-B14F-4D97-AF65-F5344CB8AC3E}">
-        <p14:creationId xmlns:p14="http://schemas.microsoft.com/office/powerpoint/2010/main" xmlns="" val="1961528746"/>
+        <p14:creationId xmlns="" xmlns:p14="http://schemas.microsoft.com/office/powerpoint/2010/main" val="1961528746"/>
       </p:ext>
     </p:extLst>
   </p:cSld>
@@ -1364,7 +1364,7 @@
             <a:fld id="{4CBF50E3-ED67-46F2-ABFC-A36EE1082CF7}" type="slidenum">
               <a:rPr lang="en-US" b="1" smtClean="0"/>
               <a:pPr/>
-              <a:t>‹Nr.›</a:t>
+              <a:t>‹#›</a:t>
             </a:fld>
             <a:endParaRPr lang="en-US" b="1" dirty="0"/>
           </a:p>
@@ -2385,7 +2385,7 @@
     </p:spTree>
     <p:extLst>
       <p:ext uri="{BB962C8B-B14F-4D97-AF65-F5344CB8AC3E}">
-        <p14:creationId xmlns:p14="http://schemas.microsoft.com/office/powerpoint/2010/main" xmlns="" val="992547163"/>
+        <p14:creationId xmlns="" xmlns:p14="http://schemas.microsoft.com/office/powerpoint/2010/main" val="992547163"/>
       </p:ext>
     </p:extLst>
   </p:cSld>
@@ -2668,7 +2668,7 @@
     </p:spTree>
     <p:extLst>
       <p:ext uri="{BB962C8B-B14F-4D97-AF65-F5344CB8AC3E}">
-        <p14:creationId xmlns:p14="http://schemas.microsoft.com/office/powerpoint/2010/main" xmlns="" val="570977232"/>
+        <p14:creationId xmlns="" xmlns:p14="http://schemas.microsoft.com/office/powerpoint/2010/main" val="570977232"/>
       </p:ext>
     </p:extLst>
   </p:cSld>
@@ -2915,7 +2915,7 @@
     </p:spTree>
     <p:extLst>
       <p:ext uri="{BB962C8B-B14F-4D97-AF65-F5344CB8AC3E}">
-        <p14:creationId xmlns:p14="http://schemas.microsoft.com/office/powerpoint/2010/main" xmlns="" val="2323644181"/>
+        <p14:creationId xmlns="" xmlns:p14="http://schemas.microsoft.com/office/powerpoint/2010/main" val="2323644181"/>
       </p:ext>
     </p:extLst>
   </p:cSld>
@@ -2999,7 +2999,26 @@
             </a:r>
             <a:r>
               <a:rPr lang="en-US" baseline="0" dirty="0" smtClean="0"/>
-              <a:t> article</a:t>
+              <a:t> </a:t>
+            </a:r>
+            <a:r>
+              <a:rPr lang="en-US" baseline="0" dirty="0" smtClean="0"/>
+              <a:t>article</a:t>
+            </a:r>
+          </a:p>
+          <a:p>
+            <a:pPr lvl="2"/>
+            <a:r>
+              <a:rPr lang="de-DE" baseline="0" dirty="0" smtClean="0"/>
+              <a:t>aber Überschneidungen zwischen Datensätzen so klein (Anzahl Personen), </a:t>
+            </a:r>
+            <a:r>
+              <a:rPr lang="de-DE" baseline="0" smtClean="0"/>
+              <a:t>dass kaum/keine repräsentativen </a:t>
+            </a:r>
+            <a:r>
+              <a:rPr lang="de-DE" baseline="0" dirty="0" smtClean="0"/>
+              <a:t>Allgemeinaussagen ablesbar sind</a:t>
             </a:r>
             <a:endParaRPr lang="en-US" dirty="0" smtClean="0"/>
           </a:p>
@@ -3039,7 +3058,7 @@
     </p:spTree>
     <p:extLst>
       <p:ext uri="{BB962C8B-B14F-4D97-AF65-F5344CB8AC3E}">
-        <p14:creationId xmlns:p14="http://schemas.microsoft.com/office/powerpoint/2010/main" xmlns="" val="596803393"/>
+        <p14:creationId xmlns="" xmlns:p14="http://schemas.microsoft.com/office/powerpoint/2010/main" val="596803393"/>
       </p:ext>
     </p:extLst>
   </p:cSld>
@@ -3166,7 +3185,7 @@
     </p:spTree>
     <p:extLst>
       <p:ext uri="{BB962C8B-B14F-4D97-AF65-F5344CB8AC3E}">
-        <p14:creationId xmlns:p14="http://schemas.microsoft.com/office/powerpoint/2010/main" xmlns="" val="1533851673"/>
+        <p14:creationId xmlns="" xmlns:p14="http://schemas.microsoft.com/office/powerpoint/2010/main" val="1533851673"/>
       </p:ext>
     </p:extLst>
   </p:cSld>
@@ -3339,14 +3358,14 @@
             </a:ln>
             <a:extLst>
               <a:ext uri="{909E8E84-426E-40DD-AFC4-6F175D3DCCD1}">
-                <a14:hiddenFill xmlns:a14="http://schemas.microsoft.com/office/drawing/2010/main" xmlns="">
+                <a14:hiddenFill xmlns="" xmlns:a14="http://schemas.microsoft.com/office/drawing/2010/main">
                   <a:solidFill>
                     <a:srgbClr val="FFFFFF"/>
                   </a:solidFill>
                 </a14:hiddenFill>
               </a:ext>
               <a:ext uri="{91240B29-F687-4F45-9708-019B960494DF}">
-                <a14:hiddenLine xmlns:a14="http://schemas.microsoft.com/office/drawing/2010/main" xmlns="" w="9525">
+                <a14:hiddenLine xmlns="" xmlns:a14="http://schemas.microsoft.com/office/drawing/2010/main" w="9525">
                   <a:solidFill>
                     <a:srgbClr val="000000"/>
                   </a:solidFill>
@@ -3381,7 +3400,7 @@
             <a:blip r:embed="rId2" cstate="screen">
               <a:extLst>
                 <a:ext uri="{28A0092B-C50C-407E-A947-70E740481C1C}">
-                  <a14:useLocalDpi xmlns:a14="http://schemas.microsoft.com/office/drawing/2010/main" xmlns=""/>
+                  <a14:useLocalDpi xmlns="" xmlns:a14="http://schemas.microsoft.com/office/drawing/2010/main"/>
                 </a:ext>
               </a:extLst>
             </a:blip>
@@ -3402,14 +3421,14 @@
             </a:ln>
             <a:extLst>
               <a:ext uri="{909E8E84-426E-40DD-AFC4-6F175D3DCCD1}">
-                <a14:hiddenFill xmlns:a14="http://schemas.microsoft.com/office/drawing/2010/main" xmlns="">
+                <a14:hiddenFill xmlns="" xmlns:a14="http://schemas.microsoft.com/office/drawing/2010/main">
                   <a:solidFill>
                     <a:srgbClr val="FFFFFF"/>
                   </a:solidFill>
                 </a14:hiddenFill>
               </a:ext>
               <a:ext uri="{91240B29-F687-4F45-9708-019B960494DF}">
-                <a14:hiddenLine xmlns:a14="http://schemas.microsoft.com/office/drawing/2010/main" xmlns="" w="9525">
+                <a14:hiddenLine xmlns="" xmlns:a14="http://schemas.microsoft.com/office/drawing/2010/main" w="9525">
                   <a:solidFill>
                     <a:srgbClr val="000000"/>
                   </a:solidFill>
@@ -3785,7 +3804,7 @@
     </p:spTree>
     <p:extLst>
       <p:ext uri="{BB962C8B-B14F-4D97-AF65-F5344CB8AC3E}">
-        <p14:creationId xmlns:p14="http://schemas.microsoft.com/office/powerpoint/2010/main" xmlns="" val="1497928299"/>
+        <p14:creationId xmlns="" xmlns:p14="http://schemas.microsoft.com/office/powerpoint/2010/main" val="1497928299"/>
       </p:ext>
     </p:extLst>
   </p:cSld>
@@ -4877,7 +4896,7 @@
           <a:p>
             <a:r>
               <a:rPr lang="en-US" smtClean="0"/>
-              <a:t>Information Integration - Exercise 2</a:t>
+              <a:t>Exercise5.pptx</a:t>
             </a:r>
             <a:endParaRPr lang="en-US" dirty="0"/>
           </a:p>
@@ -4905,7 +4924,7 @@
             <a:fld id="{91D913BA-B0D8-4B51-9328-DFAA0B370309}" type="slidenum">
               <a:rPr lang="en-US" b="1" smtClean="0"/>
               <a:pPr/>
-              <a:t>‹Nr.›</a:t>
+              <a:t>‹#›</a:t>
             </a:fld>
             <a:endParaRPr lang="en-US" b="1" dirty="0"/>
           </a:p>
@@ -4964,7 +4983,7 @@
     </p:spTree>
     <p:extLst>
       <p:ext uri="{BB962C8B-B14F-4D97-AF65-F5344CB8AC3E}">
-        <p14:creationId xmlns:p14="http://schemas.microsoft.com/office/powerpoint/2010/main" xmlns="" val="684359825"/>
+        <p14:creationId xmlns="" xmlns:p14="http://schemas.microsoft.com/office/powerpoint/2010/main" val="684359825"/>
       </p:ext>
     </p:extLst>
   </p:cSld>
@@ -5175,7 +5194,7 @@
           <a:p>
             <a:r>
               <a:rPr lang="en-US" smtClean="0"/>
-              <a:t>Information Integration - Exercise 2</a:t>
+              <a:t>Exercise5.pptx</a:t>
             </a:r>
             <a:endParaRPr lang="en-US" dirty="0"/>
           </a:p>
@@ -5203,7 +5222,7 @@
             <a:fld id="{91D913BA-B0D8-4B51-9328-DFAA0B370309}" type="slidenum">
               <a:rPr lang="en-US" b="1" smtClean="0"/>
               <a:pPr/>
-              <a:t>‹Nr.›</a:t>
+              <a:t>‹#›</a:t>
             </a:fld>
             <a:endParaRPr lang="en-US" b="1" dirty="0"/>
           </a:p>
@@ -5262,7 +5281,7 @@
     </p:spTree>
     <p:extLst>
       <p:ext uri="{BB962C8B-B14F-4D97-AF65-F5344CB8AC3E}">
-        <p14:creationId xmlns:p14="http://schemas.microsoft.com/office/powerpoint/2010/main" xmlns="" val="1751671967"/>
+        <p14:creationId xmlns="" xmlns:p14="http://schemas.microsoft.com/office/powerpoint/2010/main" val="1751671967"/>
       </p:ext>
     </p:extLst>
   </p:cSld>
@@ -5473,7 +5492,7 @@
           <a:p>
             <a:r>
               <a:rPr lang="en-US" smtClean="0"/>
-              <a:t>Information Integration - Exercise 2</a:t>
+              <a:t>Exercise5.pptx</a:t>
             </a:r>
             <a:endParaRPr lang="en-US" dirty="0"/>
           </a:p>
@@ -5501,7 +5520,7 @@
             <a:fld id="{91D913BA-B0D8-4B51-9328-DFAA0B370309}" type="slidenum">
               <a:rPr lang="en-US" b="1" smtClean="0"/>
               <a:pPr/>
-              <a:t>‹Nr.›</a:t>
+              <a:t>‹#›</a:t>
             </a:fld>
             <a:endParaRPr lang="en-US" b="1" dirty="0"/>
           </a:p>
@@ -5560,7 +5579,7 @@
     </p:spTree>
     <p:extLst>
       <p:ext uri="{BB962C8B-B14F-4D97-AF65-F5344CB8AC3E}">
-        <p14:creationId xmlns:p14="http://schemas.microsoft.com/office/powerpoint/2010/main" xmlns="" val="1823356174"/>
+        <p14:creationId xmlns="" xmlns:p14="http://schemas.microsoft.com/office/powerpoint/2010/main" val="1823356174"/>
       </p:ext>
     </p:extLst>
   </p:cSld>
@@ -5771,7 +5790,7 @@
           <a:p>
             <a:r>
               <a:rPr lang="en-US" smtClean="0"/>
-              <a:t>Information Integration - Exercise 2</a:t>
+              <a:t>Exercise5.pptx</a:t>
             </a:r>
             <a:endParaRPr lang="en-US" dirty="0"/>
           </a:p>
@@ -5799,7 +5818,7 @@
             <a:fld id="{91D913BA-B0D8-4B51-9328-DFAA0B370309}" type="slidenum">
               <a:rPr lang="en-US" b="1" smtClean="0"/>
               <a:pPr/>
-              <a:t>‹Nr.›</a:t>
+              <a:t>‹#›</a:t>
             </a:fld>
             <a:endParaRPr lang="en-US" b="1" dirty="0"/>
           </a:p>
@@ -5858,7 +5877,7 @@
     </p:spTree>
     <p:extLst>
       <p:ext uri="{BB962C8B-B14F-4D97-AF65-F5344CB8AC3E}">
-        <p14:creationId xmlns:p14="http://schemas.microsoft.com/office/powerpoint/2010/main" xmlns="" val="1119816392"/>
+        <p14:creationId xmlns="" xmlns:p14="http://schemas.microsoft.com/office/powerpoint/2010/main" val="1119816392"/>
       </p:ext>
     </p:extLst>
   </p:cSld>
@@ -6017,7 +6036,7 @@
           <a:p>
             <a:r>
               <a:rPr lang="en-US" smtClean="0"/>
-              <a:t>Information Integration - Exercise 2</a:t>
+              <a:t>Exercise5.pptx</a:t>
             </a:r>
             <a:endParaRPr lang="en-US" dirty="0"/>
           </a:p>
@@ -6045,7 +6064,7 @@
             <a:fld id="{91D913BA-B0D8-4B51-9328-DFAA0B370309}" type="slidenum">
               <a:rPr lang="en-US" b="1" smtClean="0"/>
               <a:pPr/>
-              <a:t>‹Nr.›</a:t>
+              <a:t>‹#›</a:t>
             </a:fld>
             <a:endParaRPr lang="en-US" b="1" dirty="0"/>
           </a:p>
@@ -6104,7 +6123,7 @@
     </p:spTree>
     <p:extLst>
       <p:ext uri="{BB962C8B-B14F-4D97-AF65-F5344CB8AC3E}">
-        <p14:creationId xmlns:p14="http://schemas.microsoft.com/office/powerpoint/2010/main" xmlns="" val="1025316029"/>
+        <p14:creationId xmlns="" xmlns:p14="http://schemas.microsoft.com/office/powerpoint/2010/main" val="1025316029"/>
       </p:ext>
     </p:extLst>
   </p:cSld>
@@ -6368,7 +6387,7 @@
     </p:spTree>
     <p:extLst>
       <p:ext uri="{BB962C8B-B14F-4D97-AF65-F5344CB8AC3E}">
-        <p14:creationId xmlns:p14="http://schemas.microsoft.com/office/powerpoint/2010/main" xmlns="" val="3411182617"/>
+        <p14:creationId xmlns="" xmlns:p14="http://schemas.microsoft.com/office/powerpoint/2010/main" val="3411182617"/>
       </p:ext>
     </p:extLst>
   </p:cSld>
@@ -6544,14 +6563,14 @@
             </a:ln>
             <a:extLst>
               <a:ext uri="{909E8E84-426E-40DD-AFC4-6F175D3DCCD1}">
-                <a14:hiddenFill xmlns:a14="http://schemas.microsoft.com/office/drawing/2010/main" xmlns="">
+                <a14:hiddenFill xmlns="" xmlns:a14="http://schemas.microsoft.com/office/drawing/2010/main">
                   <a:solidFill>
                     <a:srgbClr val="FFFFFF"/>
                   </a:solidFill>
                 </a14:hiddenFill>
               </a:ext>
               <a:ext uri="{91240B29-F687-4F45-9708-019B960494DF}">
-                <a14:hiddenLine xmlns:a14="http://schemas.microsoft.com/office/drawing/2010/main" xmlns="" w="9525">
+                <a14:hiddenLine xmlns="" xmlns:a14="http://schemas.microsoft.com/office/drawing/2010/main" w="9525">
                   <a:solidFill>
                     <a:srgbClr val="000000"/>
                   </a:solidFill>
@@ -6586,7 +6605,7 @@
             <a:blip r:embed="rId2" cstate="screen">
               <a:extLst>
                 <a:ext uri="{28A0092B-C50C-407E-A947-70E740481C1C}">
-                  <a14:useLocalDpi xmlns:a14="http://schemas.microsoft.com/office/drawing/2010/main" xmlns=""/>
+                  <a14:useLocalDpi xmlns="" xmlns:a14="http://schemas.microsoft.com/office/drawing/2010/main"/>
                 </a:ext>
               </a:extLst>
             </a:blip>
@@ -6607,14 +6626,14 @@
             </a:ln>
             <a:extLst>
               <a:ext uri="{909E8E84-426E-40DD-AFC4-6F175D3DCCD1}">
-                <a14:hiddenFill xmlns:a14="http://schemas.microsoft.com/office/drawing/2010/main" xmlns="">
+                <a14:hiddenFill xmlns="" xmlns:a14="http://schemas.microsoft.com/office/drawing/2010/main">
                   <a:solidFill>
                     <a:srgbClr val="FFFFFF"/>
                   </a:solidFill>
                 </a14:hiddenFill>
               </a:ext>
               <a:ext uri="{91240B29-F687-4F45-9708-019B960494DF}">
-                <a14:hiddenLine xmlns:a14="http://schemas.microsoft.com/office/drawing/2010/main" xmlns="" w="9525">
+                <a14:hiddenLine xmlns="" xmlns:a14="http://schemas.microsoft.com/office/drawing/2010/main" w="9525">
                   <a:solidFill>
                     <a:srgbClr val="000000"/>
                   </a:solidFill>
@@ -6866,7 +6885,7 @@
     </p:spTree>
     <p:extLst>
       <p:ext uri="{BB962C8B-B14F-4D97-AF65-F5344CB8AC3E}">
-        <p14:creationId xmlns:p14="http://schemas.microsoft.com/office/powerpoint/2010/main" xmlns="" val="2314300643"/>
+        <p14:creationId xmlns="" xmlns:p14="http://schemas.microsoft.com/office/powerpoint/2010/main" val="2314300643"/>
       </p:ext>
     </p:extLst>
   </p:cSld>
@@ -7042,14 +7061,14 @@
             </a:ln>
             <a:extLst>
               <a:ext uri="{909E8E84-426E-40DD-AFC4-6F175D3DCCD1}">
-                <a14:hiddenFill xmlns:a14="http://schemas.microsoft.com/office/drawing/2010/main" xmlns="">
+                <a14:hiddenFill xmlns="" xmlns:a14="http://schemas.microsoft.com/office/drawing/2010/main">
                   <a:solidFill>
                     <a:srgbClr val="FFFFFF"/>
                   </a:solidFill>
                 </a14:hiddenFill>
               </a:ext>
               <a:ext uri="{91240B29-F687-4F45-9708-019B960494DF}">
-                <a14:hiddenLine xmlns:a14="http://schemas.microsoft.com/office/drawing/2010/main" xmlns="" w="9525">
+                <a14:hiddenLine xmlns="" xmlns:a14="http://schemas.microsoft.com/office/drawing/2010/main" w="9525">
                   <a:solidFill>
                     <a:srgbClr val="000000"/>
                   </a:solidFill>
@@ -7084,7 +7103,7 @@
             <a:blip r:embed="rId2" cstate="screen">
               <a:extLst>
                 <a:ext uri="{28A0092B-C50C-407E-A947-70E740481C1C}">
-                  <a14:useLocalDpi xmlns:a14="http://schemas.microsoft.com/office/drawing/2010/main" xmlns=""/>
+                  <a14:useLocalDpi xmlns="" xmlns:a14="http://schemas.microsoft.com/office/drawing/2010/main"/>
                 </a:ext>
               </a:extLst>
             </a:blip>
@@ -7105,14 +7124,14 @@
             </a:ln>
             <a:extLst>
               <a:ext uri="{909E8E84-426E-40DD-AFC4-6F175D3DCCD1}">
-                <a14:hiddenFill xmlns:a14="http://schemas.microsoft.com/office/drawing/2010/main" xmlns="">
+                <a14:hiddenFill xmlns="" xmlns:a14="http://schemas.microsoft.com/office/drawing/2010/main">
                   <a:solidFill>
                     <a:srgbClr val="FFFFFF"/>
                   </a:solidFill>
                 </a14:hiddenFill>
               </a:ext>
               <a:ext uri="{91240B29-F687-4F45-9708-019B960494DF}">
-                <a14:hiddenLine xmlns:a14="http://schemas.microsoft.com/office/drawing/2010/main" xmlns="" w="9525">
+                <a14:hiddenLine xmlns="" xmlns:a14="http://schemas.microsoft.com/office/drawing/2010/main" w="9525">
                   <a:solidFill>
                     <a:srgbClr val="000000"/>
                   </a:solidFill>
@@ -7491,7 +7510,7 @@
     </p:spTree>
     <p:extLst>
       <p:ext uri="{BB962C8B-B14F-4D97-AF65-F5344CB8AC3E}">
-        <p14:creationId xmlns:p14="http://schemas.microsoft.com/office/powerpoint/2010/main" xmlns="" val="292368745"/>
+        <p14:creationId xmlns="" xmlns:p14="http://schemas.microsoft.com/office/powerpoint/2010/main" val="292368745"/>
       </p:ext>
     </p:extLst>
   </p:cSld>
@@ -7667,14 +7686,14 @@
             </a:ln>
             <a:extLst>
               <a:ext uri="{909E8E84-426E-40DD-AFC4-6F175D3DCCD1}">
-                <a14:hiddenFill xmlns:a14="http://schemas.microsoft.com/office/drawing/2010/main" xmlns="">
+                <a14:hiddenFill xmlns="" xmlns:a14="http://schemas.microsoft.com/office/drawing/2010/main">
                   <a:solidFill>
                     <a:srgbClr val="FFFFFF"/>
                   </a:solidFill>
                 </a14:hiddenFill>
               </a:ext>
               <a:ext uri="{91240B29-F687-4F45-9708-019B960494DF}">
-                <a14:hiddenLine xmlns:a14="http://schemas.microsoft.com/office/drawing/2010/main" xmlns="" w="9525">
+                <a14:hiddenLine xmlns="" xmlns:a14="http://schemas.microsoft.com/office/drawing/2010/main" w="9525">
                   <a:solidFill>
                     <a:srgbClr val="000000"/>
                   </a:solidFill>
@@ -7709,7 +7728,7 @@
             <a:blip r:embed="rId2" cstate="screen">
               <a:extLst>
                 <a:ext uri="{28A0092B-C50C-407E-A947-70E740481C1C}">
-                  <a14:useLocalDpi xmlns:a14="http://schemas.microsoft.com/office/drawing/2010/main" xmlns=""/>
+                  <a14:useLocalDpi xmlns="" xmlns:a14="http://schemas.microsoft.com/office/drawing/2010/main"/>
                 </a:ext>
               </a:extLst>
             </a:blip>
@@ -7730,14 +7749,14 @@
             </a:ln>
             <a:extLst>
               <a:ext uri="{909E8E84-426E-40DD-AFC4-6F175D3DCCD1}">
-                <a14:hiddenFill xmlns:a14="http://schemas.microsoft.com/office/drawing/2010/main" xmlns="">
+                <a14:hiddenFill xmlns="" xmlns:a14="http://schemas.microsoft.com/office/drawing/2010/main">
                   <a:solidFill>
                     <a:srgbClr val="FFFFFF"/>
                   </a:solidFill>
                 </a14:hiddenFill>
               </a:ext>
               <a:ext uri="{91240B29-F687-4F45-9708-019B960494DF}">
-                <a14:hiddenLine xmlns:a14="http://schemas.microsoft.com/office/drawing/2010/main" xmlns="" w="9525">
+                <a14:hiddenLine xmlns="" xmlns:a14="http://schemas.microsoft.com/office/drawing/2010/main" w="9525">
                   <a:solidFill>
                     <a:srgbClr val="000000"/>
                   </a:solidFill>
@@ -7992,7 +8011,7 @@
     </p:spTree>
     <p:extLst>
       <p:ext uri="{BB962C8B-B14F-4D97-AF65-F5344CB8AC3E}">
-        <p14:creationId xmlns:p14="http://schemas.microsoft.com/office/powerpoint/2010/main" xmlns="" val="1750457300"/>
+        <p14:creationId xmlns="" xmlns:p14="http://schemas.microsoft.com/office/powerpoint/2010/main" val="1750457300"/>
       </p:ext>
     </p:extLst>
   </p:cSld>
@@ -8313,7 +8332,7 @@
           <a:p>
             <a:r>
               <a:rPr lang="en-US" smtClean="0"/>
-              <a:t>Information Integration - Exercise 2</a:t>
+              <a:t>Exercise5.pptx</a:t>
             </a:r>
             <a:endParaRPr lang="en-US" dirty="0"/>
           </a:p>
@@ -8341,7 +8360,7 @@
             <a:fld id="{91D913BA-B0D8-4B51-9328-DFAA0B370309}" type="slidenum">
               <a:rPr lang="en-US" b="1" smtClean="0"/>
               <a:pPr/>
-              <a:t>‹Nr.›</a:t>
+              <a:t>‹#›</a:t>
             </a:fld>
             <a:endParaRPr lang="en-US" b="1" dirty="0"/>
           </a:p>
@@ -8350,7 +8369,7 @@
     </p:spTree>
     <p:extLst>
       <p:ext uri="{BB962C8B-B14F-4D97-AF65-F5344CB8AC3E}">
-        <p14:creationId xmlns:p14="http://schemas.microsoft.com/office/powerpoint/2010/main" xmlns="" val="3296948856"/>
+        <p14:creationId xmlns="" xmlns:p14="http://schemas.microsoft.com/office/powerpoint/2010/main" val="3296948856"/>
       </p:ext>
     </p:extLst>
   </p:cSld>
@@ -8527,7 +8546,7 @@
           <a:p>
             <a:r>
               <a:rPr lang="en-US" smtClean="0"/>
-              <a:t>Information Integration - Exercise 2</a:t>
+              <a:t>Exercise5.pptx</a:t>
             </a:r>
             <a:endParaRPr lang="en-US" dirty="0"/>
           </a:p>
@@ -8555,7 +8574,7 @@
             <a:fld id="{91D913BA-B0D8-4B51-9328-DFAA0B370309}" type="slidenum">
               <a:rPr lang="en-US" b="1" smtClean="0"/>
               <a:pPr/>
-              <a:t>‹Nr.›</a:t>
+              <a:t>‹#›</a:t>
             </a:fld>
             <a:endParaRPr lang="en-US" b="1" dirty="0"/>
           </a:p>
@@ -8564,7 +8583,7 @@
     </p:spTree>
     <p:extLst>
       <p:ext uri="{BB962C8B-B14F-4D97-AF65-F5344CB8AC3E}">
-        <p14:creationId xmlns:p14="http://schemas.microsoft.com/office/powerpoint/2010/main" xmlns="" val="446275408"/>
+        <p14:creationId xmlns="" xmlns:p14="http://schemas.microsoft.com/office/powerpoint/2010/main" val="446275408"/>
       </p:ext>
     </p:extLst>
   </p:cSld>
@@ -8734,7 +8753,7 @@
           <a:p>
             <a:r>
               <a:rPr lang="en-US" smtClean="0"/>
-              <a:t>Information Integration - Exercise 2</a:t>
+              <a:t>Exercise5.pptx</a:t>
             </a:r>
             <a:endParaRPr lang="en-US" dirty="0"/>
           </a:p>
@@ -8762,7 +8781,7 @@
             <a:fld id="{91D913BA-B0D8-4B51-9328-DFAA0B370309}" type="slidenum">
               <a:rPr lang="en-US" b="1" smtClean="0"/>
               <a:pPr/>
-              <a:t>‹Nr.›</a:t>
+              <a:t>‹#›</a:t>
             </a:fld>
             <a:endParaRPr lang="en-US" b="1" dirty="0"/>
           </a:p>
@@ -8821,7 +8840,7 @@
     </p:spTree>
     <p:extLst>
       <p:ext uri="{BB962C8B-B14F-4D97-AF65-F5344CB8AC3E}">
-        <p14:creationId xmlns:p14="http://schemas.microsoft.com/office/powerpoint/2010/main" xmlns="" val="3481075343"/>
+        <p14:creationId xmlns="" xmlns:p14="http://schemas.microsoft.com/office/powerpoint/2010/main" val="3481075343"/>
       </p:ext>
     </p:extLst>
   </p:cSld>
@@ -9005,7 +9024,7 @@
           <a:p>
             <a:r>
               <a:rPr lang="en-US" smtClean="0"/>
-              <a:t>Information Integration - Exercise 2</a:t>
+              <a:t>Exercise5.pptx</a:t>
             </a:r>
             <a:endParaRPr lang="en-US" dirty="0"/>
           </a:p>
@@ -9033,7 +9052,7 @@
             <a:fld id="{91D913BA-B0D8-4B51-9328-DFAA0B370309}" type="slidenum">
               <a:rPr lang="en-US" b="1" smtClean="0"/>
               <a:pPr/>
-              <a:t>‹Nr.›</a:t>
+              <a:t>‹#›</a:t>
             </a:fld>
             <a:endParaRPr lang="en-US" b="1" dirty="0"/>
           </a:p>
@@ -9092,7 +9111,7 @@
     </p:spTree>
     <p:extLst>
       <p:ext uri="{BB962C8B-B14F-4D97-AF65-F5344CB8AC3E}">
-        <p14:creationId xmlns:p14="http://schemas.microsoft.com/office/powerpoint/2010/main" xmlns="" val="3066185237"/>
+        <p14:creationId xmlns="" xmlns:p14="http://schemas.microsoft.com/office/powerpoint/2010/main" val="3066185237"/>
       </p:ext>
     </p:extLst>
   </p:cSld>
@@ -9390,7 +9409,7 @@
           <a:p>
             <a:r>
               <a:rPr lang="en-US" smtClean="0"/>
-              <a:t>Information Integration - Exercise 2</a:t>
+              <a:t>Exercise5.pptx</a:t>
             </a:r>
             <a:endParaRPr lang="en-US" dirty="0"/>
           </a:p>
@@ -9418,7 +9437,7 @@
             <a:fld id="{91D913BA-B0D8-4B51-9328-DFAA0B370309}" type="slidenum">
               <a:rPr lang="en-US" b="1" smtClean="0"/>
               <a:pPr/>
-              <a:t>‹Nr.›</a:t>
+              <a:t>‹#›</a:t>
             </a:fld>
             <a:endParaRPr lang="en-US" b="1" dirty="0"/>
           </a:p>
@@ -9477,7 +9496,7 @@
     </p:spTree>
     <p:extLst>
       <p:ext uri="{BB962C8B-B14F-4D97-AF65-F5344CB8AC3E}">
-        <p14:creationId xmlns:p14="http://schemas.microsoft.com/office/powerpoint/2010/main" xmlns="" val="405366817"/>
+        <p14:creationId xmlns="" xmlns:p14="http://schemas.microsoft.com/office/powerpoint/2010/main" val="405366817"/>
       </p:ext>
     </p:extLst>
   </p:cSld>
@@ -9783,7 +9802,7 @@
           <a:p>
             <a:r>
               <a:rPr lang="en-US" smtClean="0"/>
-              <a:t>Information Integration - Exercise 2</a:t>
+              <a:t>Exercise5.pptx</a:t>
             </a:r>
             <a:endParaRPr lang="en-US" dirty="0"/>
           </a:p>
@@ -9827,7 +9846,7 @@
             <a:fld id="{91D913BA-B0D8-4B51-9328-DFAA0B370309}" type="slidenum">
               <a:rPr lang="en-US" b="1" smtClean="0"/>
               <a:pPr/>
-              <a:t>‹Nr.›</a:t>
+              <a:t>‹#›</a:t>
             </a:fld>
             <a:endParaRPr lang="en-US" b="1" dirty="0"/>
           </a:p>
@@ -11213,14 +11232,14 @@
             </a:ln>
             <a:extLst>
               <a:ext uri="{909E8E84-426E-40DD-AFC4-6F175D3DCCD1}">
-                <a14:hiddenFill xmlns:a14="http://schemas.microsoft.com/office/drawing/2010/main" xmlns="">
+                <a14:hiddenFill xmlns="" xmlns:a14="http://schemas.microsoft.com/office/drawing/2010/main">
                   <a:solidFill>
                     <a:srgbClr val="FFFFFF"/>
                   </a:solidFill>
                 </a14:hiddenFill>
               </a:ext>
               <a:ext uri="{91240B29-F687-4F45-9708-019B960494DF}">
-                <a14:hiddenLine xmlns:a14="http://schemas.microsoft.com/office/drawing/2010/main" xmlns="" w="9525">
+                <a14:hiddenLine xmlns="" xmlns:a14="http://schemas.microsoft.com/office/drawing/2010/main" w="9525">
                   <a:solidFill>
                     <a:srgbClr val="000000"/>
                   </a:solidFill>
@@ -11255,7 +11274,7 @@
             <a:blip r:embed="rId17" cstate="screen">
               <a:extLst>
                 <a:ext uri="{28A0092B-C50C-407E-A947-70E740481C1C}">
-                  <a14:useLocalDpi xmlns:a14="http://schemas.microsoft.com/office/drawing/2010/main" xmlns=""/>
+                  <a14:useLocalDpi xmlns="" xmlns:a14="http://schemas.microsoft.com/office/drawing/2010/main"/>
                 </a:ext>
               </a:extLst>
             </a:blip>
@@ -11276,14 +11295,14 @@
             </a:ln>
             <a:extLst>
               <a:ext uri="{909E8E84-426E-40DD-AFC4-6F175D3DCCD1}">
-                <a14:hiddenFill xmlns:a14="http://schemas.microsoft.com/office/drawing/2010/main" xmlns="">
+                <a14:hiddenFill xmlns="" xmlns:a14="http://schemas.microsoft.com/office/drawing/2010/main">
                   <a:solidFill>
                     <a:srgbClr val="FFFFFF"/>
                   </a:solidFill>
                 </a14:hiddenFill>
               </a:ext>
               <a:ext uri="{91240B29-F687-4F45-9708-019B960494DF}">
-                <a14:hiddenLine xmlns:a14="http://schemas.microsoft.com/office/drawing/2010/main" xmlns="" w="9525">
+                <a14:hiddenLine xmlns="" xmlns:a14="http://schemas.microsoft.com/office/drawing/2010/main" w="9525">
                   <a:solidFill>
                     <a:srgbClr val="000000"/>
                   </a:solidFill>
@@ -11345,7 +11364,7 @@
     </p:spTree>
     <p:extLst>
       <p:ext uri="{BB962C8B-B14F-4D97-AF65-F5344CB8AC3E}">
-        <p14:creationId xmlns:p14="http://schemas.microsoft.com/office/powerpoint/2010/main" xmlns="" val="45069319"/>
+        <p14:creationId xmlns="" xmlns:p14="http://schemas.microsoft.com/office/powerpoint/2010/main" val="45069319"/>
       </p:ext>
     </p:extLst>
   </p:cSld>
@@ -11733,7 +11752,7 @@
           <a:blip r:embed="rId3" cstate="print">
             <a:extLst>
               <a:ext uri="{28A0092B-C50C-407E-A947-70E740481C1C}">
-                <a14:useLocalDpi xmlns:a14="http://schemas.microsoft.com/office/drawing/2010/main" xmlns="" val="0"/>
+                <a14:useLocalDpi xmlns="" xmlns:a14="http://schemas.microsoft.com/office/drawing/2010/main" val="0"/>
               </a:ext>
             </a:extLst>
           </a:blip>
@@ -11834,7 +11853,7 @@
     </p:spTree>
     <p:extLst>
       <p:ext uri="{BB962C8B-B14F-4D97-AF65-F5344CB8AC3E}">
-        <p14:creationId xmlns:p14="http://schemas.microsoft.com/office/powerpoint/2010/main" xmlns="" val="1122100053"/>
+        <p14:creationId xmlns="" xmlns:p14="http://schemas.microsoft.com/office/powerpoint/2010/main" val="1122100053"/>
       </p:ext>
     </p:extLst>
   </p:cSld>
@@ -11912,8 +11931,8 @@
           <a:lstStyle/>
           <a:p>
             <a:r>
-              <a:rPr lang="de-DE" dirty="0" smtClean="0"/>
-              <a:t>Neuschäfer-Rube, Pollak, Reschke, Rückert  01.02.2016</a:t>
+              <a:rPr lang="de-DE" smtClean="0"/>
+              <a:t>Neuschäfer-Rube, Pollak, Reschke, Rückert  23.11.2015</a:t>
             </a:r>
             <a:endParaRPr lang="en-US" dirty="0"/>
           </a:p>
@@ -11935,13 +11954,10 @@
           <a:lstStyle/>
           <a:p>
             <a:r>
-              <a:rPr lang="en-US" dirty="0" smtClean="0"/>
-              <a:t>Information Integration - Exercise </a:t>
-            </a:r>
-            <a:r>
-              <a:rPr lang="en-US" dirty="0"/>
-              <a:t>5</a:t>
-            </a:r>
+              <a:rPr lang="en-US" smtClean="0"/>
+              <a:t>Exercise5.pptx</a:t>
+            </a:r>
+            <a:endParaRPr lang="en-US" dirty="0"/>
           </a:p>
         </p:txBody>
       </p:sp>
@@ -12000,7 +12016,7 @@
     </p:spTree>
     <p:extLst>
       <p:ext uri="{BB962C8B-B14F-4D97-AF65-F5344CB8AC3E}">
-        <p14:creationId xmlns:p14="http://schemas.microsoft.com/office/powerpoint/2010/main" xmlns="" val="2371577948"/>
+        <p14:creationId xmlns="" xmlns:p14="http://schemas.microsoft.com/office/powerpoint/2010/main" val="2371577948"/>
       </p:ext>
     </p:extLst>
   </p:cSld>
@@ -12127,12 +12143,8 @@
           <a:lstStyle/>
           <a:p>
             <a:r>
-              <a:rPr lang="de-DE" dirty="0" smtClean="0"/>
-              <a:t>Neuschäfer-Rube, Pollak, Reschke, Rückert  </a:t>
-            </a:r>
-            <a:r>
-              <a:rPr lang="de-DE" dirty="0" smtClean="0"/>
-              <a:t>01.02.2016</a:t>
+              <a:rPr lang="de-DE" smtClean="0"/>
+              <a:t>Neuschäfer-Rube, Pollak, Reschke, Rückert  23.11.2015</a:t>
             </a:r>
             <a:endParaRPr lang="en-US" dirty="0"/>
           </a:p>
@@ -12155,7 +12167,7 @@
           <a:p>
             <a:r>
               <a:rPr lang="en-US" smtClean="0"/>
-              <a:t>Information Integration - Exercise 2</a:t>
+              <a:t>Exercise5.pptx</a:t>
             </a:r>
             <a:endParaRPr lang="en-US" dirty="0"/>
           </a:p>
@@ -12220,7 +12232,7 @@
           <a:blip r:embed="rId3" cstate="print">
             <a:extLst>
               <a:ext uri="{28A0092B-C50C-407E-A947-70E740481C1C}">
-                <a14:useLocalDpi xmlns:a14="http://schemas.microsoft.com/office/drawing/2010/main" xmlns="" val="0"/>
+                <a14:useLocalDpi xmlns="" xmlns:a14="http://schemas.microsoft.com/office/drawing/2010/main" val="0"/>
               </a:ext>
             </a:extLst>
           </a:blip>
@@ -12240,7 +12252,7 @@
           <a:noFill/>
           <a:extLst>
             <a:ext uri="{909E8E84-426E-40DD-AFC4-6F175D3DCCD1}">
-              <a14:hiddenFill xmlns:a14="http://schemas.microsoft.com/office/drawing/2010/main" xmlns="">
+              <a14:hiddenFill xmlns="" xmlns:a14="http://schemas.microsoft.com/office/drawing/2010/main">
                 <a:solidFill>
                   <a:srgbClr val="FFFFFF"/>
                 </a:solidFill>
@@ -12252,7 +12264,7 @@
     </p:spTree>
     <p:extLst>
       <p:ext uri="{BB962C8B-B14F-4D97-AF65-F5344CB8AC3E}">
-        <p14:creationId xmlns:p14="http://schemas.microsoft.com/office/powerpoint/2010/main" xmlns="" val="148149715"/>
+        <p14:creationId xmlns="" xmlns:p14="http://schemas.microsoft.com/office/powerpoint/2010/main" val="148149715"/>
       </p:ext>
     </p:extLst>
   </p:cSld>
@@ -12307,11 +12319,7 @@
             </a:r>
             <a:r>
               <a:rPr lang="en-US" dirty="0" smtClean="0"/>
-              <a:t> turned </a:t>
-            </a:r>
-            <a:r>
-              <a:rPr lang="en-US" dirty="0" smtClean="0"/>
-              <a:t>out to be good or bad?</a:t>
+              <a:t> turned out to be good or bad?</a:t>
             </a:r>
           </a:p>
           <a:p>
@@ -12370,19 +12378,7 @@
             </a:r>
             <a:r>
               <a:rPr lang="en-US" dirty="0" smtClean="0"/>
-              <a:t> </a:t>
-            </a:r>
-            <a:r>
-              <a:rPr lang="en-US" dirty="0" smtClean="0"/>
-              <a:t>t</a:t>
-            </a:r>
-            <a:r>
-              <a:rPr lang="en-US" dirty="0" smtClean="0"/>
-              <a:t>oo </a:t>
-            </a:r>
-            <a:r>
-              <a:rPr lang="en-US" dirty="0" smtClean="0"/>
-              <a:t>many NULL values </a:t>
+              <a:t> too many NULL values </a:t>
             </a:r>
           </a:p>
           <a:p>
@@ -12407,19 +12403,7 @@
             <a:pPr lvl="1"/>
             <a:r>
               <a:rPr lang="en-US" dirty="0" smtClean="0"/>
-              <a:t>Mostly correct </a:t>
-            </a:r>
-            <a:r>
-              <a:rPr lang="en-US" dirty="0" smtClean="0"/>
-              <a:t>/ </a:t>
-            </a:r>
-            <a:r>
-              <a:rPr lang="en-US" dirty="0" smtClean="0"/>
-              <a:t>reasonable </a:t>
-            </a:r>
-            <a:r>
-              <a:rPr lang="en-US" dirty="0" smtClean="0"/>
-              <a:t>answers</a:t>
+              <a:t>Mostly correct / reasonable answers</a:t>
             </a:r>
           </a:p>
           <a:p>
@@ -12550,11 +12534,7 @@
             </a:r>
             <a:r>
               <a:rPr lang="de-DE" dirty="0" err="1" smtClean="0"/>
-              <a:t>chose</a:t>
-            </a:r>
-            <a:r>
-              <a:rPr lang="de-DE" dirty="0" err="1" smtClean="0"/>
-              <a:t>n</a:t>
+              <a:t>chosen</a:t>
             </a:r>
             <a:r>
               <a:rPr lang="de-DE" dirty="0" smtClean="0"/>
@@ -12622,8 +12602,8 @@
           <a:lstStyle/>
           <a:p>
             <a:r>
-              <a:rPr lang="de-DE" dirty="0" smtClean="0"/>
-              <a:t>Neuschäfer-Rube, Pollak, Reschke, Rückert  01.02.2016</a:t>
+              <a:rPr lang="de-DE" smtClean="0"/>
+              <a:t>Neuschäfer-Rube, Pollak, Reschke, Rückert  23.11.2015</a:t>
             </a:r>
             <a:endParaRPr lang="en-US" dirty="0"/>
           </a:p>
@@ -12645,13 +12625,10 @@
           <a:lstStyle/>
           <a:p>
             <a:r>
-              <a:rPr lang="en-US" dirty="0" smtClean="0"/>
-              <a:t>Information Integration - Exercise </a:t>
-            </a:r>
-            <a:r>
-              <a:rPr lang="en-US" dirty="0"/>
-              <a:t>5</a:t>
-            </a:r>
+              <a:rPr lang="en-US" smtClean="0"/>
+              <a:t>Exercise5.pptx</a:t>
+            </a:r>
+            <a:endParaRPr lang="en-US" dirty="0"/>
           </a:p>
         </p:txBody>
       </p:sp>
@@ -12686,7 +12663,7 @@
     </p:spTree>
     <p:extLst>
       <p:ext uri="{BB962C8B-B14F-4D97-AF65-F5344CB8AC3E}">
-        <p14:creationId xmlns:p14="http://schemas.microsoft.com/office/powerpoint/2010/main" xmlns="" val="3110667540"/>
+        <p14:creationId xmlns="" xmlns:p14="http://schemas.microsoft.com/office/powerpoint/2010/main" val="3110667540"/>
       </p:ext>
     </p:extLst>
   </p:cSld>
@@ -13025,7 +13002,7 @@
   <a:extraClrSchemeLst/>
   <a:extLst>
     <a:ext uri="{05A4C25C-085E-4340-85A3-A5531E510DB2}">
-      <thm15:themeFamily xmlns:thm15="http://schemas.microsoft.com/office/thememl/2012/main" xmlns="" name="TEMPLATE_HPI_05_EXP" id="{EEEEA749-3836-4DC6-BA52-AE8D0ADE122A}" vid="{1AF48529-3759-4302-91D0-708D448B88CB}"/>
+      <thm15:themeFamily xmlns="" xmlns:thm15="http://schemas.microsoft.com/office/thememl/2012/main" name="TEMPLATE_HPI_05_EXP" id="{EEEEA749-3836-4DC6-BA52-AE8D0ADE122A}" vid="{1AF48529-3759-4302-91D0-708D448B88CB}"/>
     </a:ext>
   </a:extLst>
 </a:theme>

</xml_diff>